<commit_message>
[doc] (plan de test): Ecriture du plan de test de l'authentification
</commit_message>
<xml_diff>
--- a/WIP/plan de test/planTestAuthentification.pptx
+++ b/WIP/plan de test/planTestAuthentification.pptx
@@ -376,7 +376,7 @@
           <a:p>
             <a:fld id="{1E206A72-DB16-4980-9BFD-3CFD1C680CE7}" type="datetimeFigureOut">
               <a:rPr lang="fr-FR" smtClean="0"/>
-              <a:t>25/11/2024</a:t>
+              <a:t>02/12/2024</a:t>
             </a:fld>
             <a:endParaRPr lang="fr-FR"/>
           </a:p>
@@ -574,7 +574,7 @@
           <a:p>
             <a:fld id="{1E206A72-DB16-4980-9BFD-3CFD1C680CE7}" type="datetimeFigureOut">
               <a:rPr lang="fr-FR" smtClean="0"/>
-              <a:t>25/11/2024</a:t>
+              <a:t>02/12/2024</a:t>
             </a:fld>
             <a:endParaRPr lang="fr-FR"/>
           </a:p>
@@ -782,7 +782,7 @@
           <a:p>
             <a:fld id="{1E206A72-DB16-4980-9BFD-3CFD1C680CE7}" type="datetimeFigureOut">
               <a:rPr lang="fr-FR" smtClean="0"/>
-              <a:t>25/11/2024</a:t>
+              <a:t>02/12/2024</a:t>
             </a:fld>
             <a:endParaRPr lang="fr-FR"/>
           </a:p>
@@ -980,7 +980,7 @@
           <a:p>
             <a:fld id="{1E206A72-DB16-4980-9BFD-3CFD1C680CE7}" type="datetimeFigureOut">
               <a:rPr lang="fr-FR" smtClean="0"/>
-              <a:t>25/11/2024</a:t>
+              <a:t>02/12/2024</a:t>
             </a:fld>
             <a:endParaRPr lang="fr-FR"/>
           </a:p>
@@ -1255,7 +1255,7 @@
           <a:p>
             <a:fld id="{1E206A72-DB16-4980-9BFD-3CFD1C680CE7}" type="datetimeFigureOut">
               <a:rPr lang="fr-FR" smtClean="0"/>
-              <a:t>25/11/2024</a:t>
+              <a:t>02/12/2024</a:t>
             </a:fld>
             <a:endParaRPr lang="fr-FR"/>
           </a:p>
@@ -1520,7 +1520,7 @@
           <a:p>
             <a:fld id="{1E206A72-DB16-4980-9BFD-3CFD1C680CE7}" type="datetimeFigureOut">
               <a:rPr lang="fr-FR" smtClean="0"/>
-              <a:t>25/11/2024</a:t>
+              <a:t>02/12/2024</a:t>
             </a:fld>
             <a:endParaRPr lang="fr-FR"/>
           </a:p>
@@ -1932,7 +1932,7 @@
           <a:p>
             <a:fld id="{1E206A72-DB16-4980-9BFD-3CFD1C680CE7}" type="datetimeFigureOut">
               <a:rPr lang="fr-FR" smtClean="0"/>
-              <a:t>25/11/2024</a:t>
+              <a:t>02/12/2024</a:t>
             </a:fld>
             <a:endParaRPr lang="fr-FR"/>
           </a:p>
@@ -2073,7 +2073,7 @@
           <a:p>
             <a:fld id="{1E206A72-DB16-4980-9BFD-3CFD1C680CE7}" type="datetimeFigureOut">
               <a:rPr lang="fr-FR" smtClean="0"/>
-              <a:t>25/11/2024</a:t>
+              <a:t>02/12/2024</a:t>
             </a:fld>
             <a:endParaRPr lang="fr-FR"/>
           </a:p>
@@ -2186,7 +2186,7 @@
           <a:p>
             <a:fld id="{1E206A72-DB16-4980-9BFD-3CFD1C680CE7}" type="datetimeFigureOut">
               <a:rPr lang="fr-FR" smtClean="0"/>
-              <a:t>25/11/2024</a:t>
+              <a:t>02/12/2024</a:t>
             </a:fld>
             <a:endParaRPr lang="fr-FR"/>
           </a:p>
@@ -2497,7 +2497,7 @@
           <a:p>
             <a:fld id="{1E206A72-DB16-4980-9BFD-3CFD1C680CE7}" type="datetimeFigureOut">
               <a:rPr lang="fr-FR" smtClean="0"/>
-              <a:t>25/11/2024</a:t>
+              <a:t>02/12/2024</a:t>
             </a:fld>
             <a:endParaRPr lang="fr-FR"/>
           </a:p>
@@ -2785,7 +2785,7 @@
           <a:p>
             <a:fld id="{1E206A72-DB16-4980-9BFD-3CFD1C680CE7}" type="datetimeFigureOut">
               <a:rPr lang="fr-FR" smtClean="0"/>
-              <a:t>25/11/2024</a:t>
+              <a:t>02/12/2024</a:t>
             </a:fld>
             <a:endParaRPr lang="fr-FR"/>
           </a:p>
@@ -3026,7 +3026,7 @@
           <a:p>
             <a:fld id="{1E206A72-DB16-4980-9BFD-3CFD1C680CE7}" type="datetimeFigureOut">
               <a:rPr lang="fr-FR" smtClean="0"/>
-              <a:t>25/11/2024</a:t>
+              <a:t>02/12/2024</a:t>
             </a:fld>
             <a:endParaRPr lang="fr-FR"/>
           </a:p>
@@ -3679,7 +3679,7 @@
               </a:r>
               <a:r>
                 <a:rPr lang="fr-FR" sz="1400" dirty="0"/>
-                <a:t>du plan de test : Ce plan de test permet de vérifier la connexion à un compte.</a:t>
+                <a:t>du plan de test : Ce plan de test permet de vérifier la création d’un compte.</a:t>
               </a:r>
             </a:p>
           </p:txBody>
@@ -3862,7 +3862,7 @@
               </a:pPr>
               <a:r>
                 <a:rPr lang="fr-FR" sz="1200" kern="1200" dirty="0"/>
-                <a:t>Entrée de l’Email, Entrée du mot de passe.</a:t>
+                <a:t>Entrée de l’Email, Entrée du mot de passe et confirmation de mot de passe.</a:t>
               </a:r>
             </a:p>
             <a:p>
@@ -3879,7 +3879,7 @@
               </a:pPr>
               <a:r>
                 <a:rPr lang="fr-FR" sz="1200" dirty="0"/>
-                <a:t>Test de connexion vide.</a:t>
+                <a:t>Test de création vide.</a:t>
               </a:r>
             </a:p>
             <a:p>
@@ -3896,7 +3896,24 @@
               </a:pPr>
               <a:r>
                 <a:rPr lang="fr-FR" sz="1200" dirty="0"/>
-                <a:t>Test de connexion.</a:t>
+                <a:t>Test de création.</a:t>
+              </a:r>
+            </a:p>
+            <a:p>
+              <a:pPr defTabSz="2400300">
+                <a:lnSpc>
+                  <a:spcPct val="90000"/>
+                </a:lnSpc>
+                <a:spcBef>
+                  <a:spcPct val="0"/>
+                </a:spcBef>
+                <a:spcAft>
+                  <a:spcPct val="35000"/>
+                </a:spcAft>
+              </a:pPr>
+              <a:r>
+                <a:rPr lang="fr-FR" sz="1200" dirty="0"/>
+                <a:t>Création d’un compte déjà existant</a:t>
               </a:r>
             </a:p>
             <a:p>
@@ -4329,7 +4346,7 @@
               </a:pPr>
               <a:r>
                 <a:rPr lang="fr-FR" sz="1400" dirty="0"/>
-                <a:t>- Faux mot de passe</a:t>
+                <a:t>- Mot de passe aléatoire</a:t>
               </a:r>
             </a:p>
             <a:p>
@@ -4767,7 +4784,23 @@
                     <a:schemeClr val="tx1"/>
                   </a:solidFill>
                 </a:rPr>
-                <a:t>Ne pas supprimé les comptes créer</a:t>
+                <a:t>Ne pas créer de compte dans la </a:t>
+              </a:r>
+              <a:r>
+                <a:rPr lang="fr-FR" sz="1400" dirty="0" err="1">
+                  <a:solidFill>
+                    <a:schemeClr val="tx1"/>
+                  </a:solidFill>
+                </a:rPr>
+                <a:t>db</a:t>
+              </a:r>
+              <a:r>
+                <a:rPr lang="fr-FR" sz="1400" dirty="0">
+                  <a:solidFill>
+                    <a:schemeClr val="tx1"/>
+                  </a:solidFill>
+                </a:rPr>
+                <a:t> de production</a:t>
               </a:r>
             </a:p>
           </p:txBody>
@@ -5327,6 +5360,26 @@
 </file>
 
 <file path=customXml/item1.xml><?xml version="1.0" encoding="utf-8"?>
+<p:properties xmlns:p="http://schemas.microsoft.com/office/2006/metadata/properties" xmlns:xsi="http://www.w3.org/2001/XMLSchema-instance" xmlns:pc="http://schemas.microsoft.com/office/infopath/2007/PartnerControls">
+  <documentManagement>
+    <lcf76f155ced4ddcb4097134ff3c332f xmlns="b5cf4370-ac38-4b9e-9836-ef6f5df64f24">
+      <Terms xmlns="http://schemas.microsoft.com/office/infopath/2007/PartnerControls"/>
+    </lcf76f155ced4ddcb4097134ff3c332f>
+    <TaxCatchAll xmlns="eefa3612-053e-497a-ae76-8a76877f5e22" xsi:nil="true"/>
+  </documentManagement>
+</p:properties>
+</file>
+
+<file path=customXml/item2.xml><?xml version="1.0" encoding="utf-8"?>
+<?mso-contentType ?>
+<FormTemplates xmlns="http://schemas.microsoft.com/sharepoint/v3/contenttype/forms">
+  <Display>DocumentLibraryForm</Display>
+  <Edit>DocumentLibraryForm</Edit>
+  <New>DocumentLibraryForm</New>
+</FormTemplates>
+</file>
+
+<file path=customXml/item3.xml><?xml version="1.0" encoding="utf-8"?>
 <ct:contentTypeSchema xmlns:ct="http://schemas.microsoft.com/office/2006/metadata/contentType" xmlns:ma="http://schemas.microsoft.com/office/2006/metadata/properties/metaAttributes" ct:_="" ma:_="" ma:contentTypeName="Document" ma:contentTypeID="0x01010080C9F2488912074FB587B9AD9ADAE5BB" ma:contentTypeVersion="11" ma:contentTypeDescription="Crée un document." ma:contentTypeScope="" ma:versionID="1bebaa2d391e7c30de2dcb588a772684">
   <xsd:schema xmlns:xsd="http://www.w3.org/2001/XMLSchema" xmlns:xs="http://www.w3.org/2001/XMLSchema" xmlns:p="http://schemas.microsoft.com/office/2006/metadata/properties" xmlns:ns2="b5cf4370-ac38-4b9e-9836-ef6f5df64f24" xmlns:ns3="eefa3612-053e-497a-ae76-8a76877f5e22" targetNamespace="http://schemas.microsoft.com/office/2006/metadata/properties" ma:root="true" ma:fieldsID="071e4af5f84e298b60331b8e79120627" ns2:_="" ns3:_="">
     <xsd:import namespace="b5cf4370-ac38-4b9e-9836-ef6f5df64f24"/>
@@ -5521,27 +5574,26 @@
 </ct:contentTypeSchema>
 </file>
 
-<file path=customXml/item2.xml><?xml version="1.0" encoding="utf-8"?>
-<?mso-contentType ?>
-<FormTemplates xmlns="http://schemas.microsoft.com/sharepoint/v3/contenttype/forms">
-  <Display>DocumentLibraryForm</Display>
-  <Edit>DocumentLibraryForm</Edit>
-  <New>DocumentLibraryForm</New>
-</FormTemplates>
+<file path=customXml/itemProps1.xml><?xml version="1.0" encoding="utf-8"?>
+<ds:datastoreItem xmlns:ds="http://schemas.openxmlformats.org/officeDocument/2006/customXml" ds:itemID="{8A70AF45-36D6-4247-AA7E-6372E9B9F7E1}">
+  <ds:schemaRefs>
+    <ds:schemaRef ds:uri="http://schemas.microsoft.com/office/2006/metadata/properties"/>
+    <ds:schemaRef ds:uri="http://schemas.microsoft.com/office/infopath/2007/PartnerControls"/>
+    <ds:schemaRef ds:uri="b5cf4370-ac38-4b9e-9836-ef6f5df64f24"/>
+    <ds:schemaRef ds:uri="eefa3612-053e-497a-ae76-8a76877f5e22"/>
+  </ds:schemaRefs>
+</ds:datastoreItem>
 </file>
 
-<file path=customXml/item3.xml><?xml version="1.0" encoding="utf-8"?>
-<p:properties xmlns:p="http://schemas.microsoft.com/office/2006/metadata/properties" xmlns:xsi="http://www.w3.org/2001/XMLSchema-instance" xmlns:pc="http://schemas.microsoft.com/office/infopath/2007/PartnerControls">
-  <documentManagement>
-    <lcf76f155ced4ddcb4097134ff3c332f xmlns="b5cf4370-ac38-4b9e-9836-ef6f5df64f24">
-      <Terms xmlns="http://schemas.microsoft.com/office/infopath/2007/PartnerControls"/>
-    </lcf76f155ced4ddcb4097134ff3c332f>
-    <TaxCatchAll xmlns="eefa3612-053e-497a-ae76-8a76877f5e22" xsi:nil="true"/>
-  </documentManagement>
-</p:properties>
+<file path=customXml/itemProps2.xml><?xml version="1.0" encoding="utf-8"?>
+<ds:datastoreItem xmlns:ds="http://schemas.openxmlformats.org/officeDocument/2006/customXml" ds:itemID="{64DB6A9B-4014-4350-8FE6-F72DA25DFBDF}">
+  <ds:schemaRefs>
+    <ds:schemaRef ds:uri="http://schemas.microsoft.com/sharepoint/v3/contenttype/forms"/>
+  </ds:schemaRefs>
+</ds:datastoreItem>
 </file>
 
-<file path=customXml/itemProps1.xml><?xml version="1.0" encoding="utf-8"?>
+<file path=customXml/itemProps3.xml><?xml version="1.0" encoding="utf-8"?>
 <ds:datastoreItem xmlns:ds="http://schemas.openxmlformats.org/officeDocument/2006/customXml" ds:itemID="{C2099935-ADE8-4E25-82AD-270299869B08}">
   <ds:schemaRefs>
     <ds:schemaRef ds:uri="http://schemas.microsoft.com/office/2006/metadata/contentType"/>
@@ -5558,23 +5610,4 @@
     <ds:schemaRef ds:uri="http://schemas.microsoft.com/internal/obd"/>
   </ds:schemaRefs>
 </ds:datastoreItem>
-</file>
-
-<file path=customXml/itemProps2.xml><?xml version="1.0" encoding="utf-8"?>
-<ds:datastoreItem xmlns:ds="http://schemas.openxmlformats.org/officeDocument/2006/customXml" ds:itemID="{64DB6A9B-4014-4350-8FE6-F72DA25DFBDF}">
-  <ds:schemaRefs>
-    <ds:schemaRef ds:uri="http://schemas.microsoft.com/sharepoint/v3/contenttype/forms"/>
-  </ds:schemaRefs>
-</ds:datastoreItem>
-</file>
-
-<file path=customXml/itemProps3.xml><?xml version="1.0" encoding="utf-8"?>
-<ds:datastoreItem xmlns:ds="http://schemas.openxmlformats.org/officeDocument/2006/customXml" ds:itemID="{8A70AF45-36D6-4247-AA7E-6372E9B9F7E1}">
-  <ds:schemaRefs>
-    <ds:schemaRef ds:uri="http://schemas.microsoft.com/office/2006/metadata/properties"/>
-    <ds:schemaRef ds:uri="http://schemas.microsoft.com/office/infopath/2007/PartnerControls"/>
-    <ds:schemaRef ds:uri="b5cf4370-ac38-4b9e-9836-ef6f5df64f24"/>
-    <ds:schemaRef ds:uri="eefa3612-053e-497a-ae76-8a76877f5e22"/>
-  </ds:schemaRefs>
-</ds:datastoreItem>
 </file>
</xml_diff>

<commit_message>
[doc] (plan de test): Update plan de test authentification
</commit_message>
<xml_diff>
--- a/WIP/plan de test/planTestAuthentification.pptx
+++ b/WIP/plan de test/planTestAuthentification.pptx
@@ -3679,7 +3679,7 @@
               </a:r>
               <a:r>
                 <a:rPr lang="fr-FR" sz="1400" dirty="0"/>
-                <a:t>du plan de test : Ce plan de test permet de vérifier la création d’un compte.</a:t>
+                <a:t>du plan de test : Ce plan de test permet de vérifier l’authentification a un compte.</a:t>
               </a:r>
             </a:p>
           </p:txBody>
@@ -3862,7 +3862,7 @@
               </a:pPr>
               <a:r>
                 <a:rPr lang="fr-FR" sz="1200" kern="1200" dirty="0"/>
-                <a:t>Entrée de l’Email, Entrée du mot de passe et confirmation de mot de passe.</a:t>
+                <a:t>Entrée de l’Email, Entrée du mot de passe.</a:t>
               </a:r>
             </a:p>
             <a:p>
@@ -3879,7 +3879,7 @@
               </a:pPr>
               <a:r>
                 <a:rPr lang="fr-FR" sz="1200" dirty="0"/>
-                <a:t>Test de création vide.</a:t>
+                <a:t>Test de connexion vide.</a:t>
               </a:r>
             </a:p>
             <a:p>
@@ -3896,39 +3896,8 @@
               </a:pPr>
               <a:r>
                 <a:rPr lang="fr-FR" sz="1200" dirty="0"/>
-                <a:t>Test de création.</a:t>
+                <a:t>Test de connexion correct.</a:t>
               </a:r>
-            </a:p>
-            <a:p>
-              <a:pPr defTabSz="2400300">
-                <a:lnSpc>
-                  <a:spcPct val="90000"/>
-                </a:lnSpc>
-                <a:spcBef>
-                  <a:spcPct val="0"/>
-                </a:spcBef>
-                <a:spcAft>
-                  <a:spcPct val="35000"/>
-                </a:spcAft>
-              </a:pPr>
-              <a:r>
-                <a:rPr lang="fr-FR" sz="1200" dirty="0"/>
-                <a:t>Création d’un compte déjà existant</a:t>
-              </a:r>
-            </a:p>
-            <a:p>
-              <a:pPr defTabSz="2400300">
-                <a:lnSpc>
-                  <a:spcPct val="90000"/>
-                </a:lnSpc>
-                <a:spcBef>
-                  <a:spcPct val="0"/>
-                </a:spcBef>
-                <a:spcAft>
-                  <a:spcPct val="35000"/>
-                </a:spcAft>
-              </a:pPr>
-              <a:endParaRPr lang="fr-FR" sz="1200" dirty="0"/>
             </a:p>
             <a:p>
               <a:pPr defTabSz="2400300">
@@ -4784,23 +4753,7 @@
                     <a:schemeClr val="tx1"/>
                   </a:solidFill>
                 </a:rPr>
-                <a:t>Ne pas créer de compte dans la </a:t>
-              </a:r>
-              <a:r>
-                <a:rPr lang="fr-FR" sz="1400" dirty="0" err="1">
-                  <a:solidFill>
-                    <a:schemeClr val="tx1"/>
-                  </a:solidFill>
-                </a:rPr>
-                <a:t>db</a:t>
-              </a:r>
-              <a:r>
-                <a:rPr lang="fr-FR" sz="1400" dirty="0">
-                  <a:solidFill>
-                    <a:schemeClr val="tx1"/>
-                  </a:solidFill>
-                </a:rPr>
-                <a:t> de production</a:t>
+                <a:t>Ne pas utiliser de compte présent en production</a:t>
               </a:r>
             </a:p>
           </p:txBody>
@@ -5046,7 +4999,7 @@
             </a:pPr>
             <a:r>
               <a:rPr lang="fr-FR" sz="2400" dirty="0"/>
-              <a:t>Création de compte</a:t>
+              <a:t>Connexion de compte</a:t>
             </a:r>
           </a:p>
         </p:txBody>
@@ -5360,26 +5313,6 @@
 </file>
 
 <file path=customXml/item1.xml><?xml version="1.0" encoding="utf-8"?>
-<p:properties xmlns:p="http://schemas.microsoft.com/office/2006/metadata/properties" xmlns:xsi="http://www.w3.org/2001/XMLSchema-instance" xmlns:pc="http://schemas.microsoft.com/office/infopath/2007/PartnerControls">
-  <documentManagement>
-    <lcf76f155ced4ddcb4097134ff3c332f xmlns="b5cf4370-ac38-4b9e-9836-ef6f5df64f24">
-      <Terms xmlns="http://schemas.microsoft.com/office/infopath/2007/PartnerControls"/>
-    </lcf76f155ced4ddcb4097134ff3c332f>
-    <TaxCatchAll xmlns="eefa3612-053e-497a-ae76-8a76877f5e22" xsi:nil="true"/>
-  </documentManagement>
-</p:properties>
-</file>
-
-<file path=customXml/item2.xml><?xml version="1.0" encoding="utf-8"?>
-<?mso-contentType ?>
-<FormTemplates xmlns="http://schemas.microsoft.com/sharepoint/v3/contenttype/forms">
-  <Display>DocumentLibraryForm</Display>
-  <Edit>DocumentLibraryForm</Edit>
-  <New>DocumentLibraryForm</New>
-</FormTemplates>
-</file>
-
-<file path=customXml/item3.xml><?xml version="1.0" encoding="utf-8"?>
 <ct:contentTypeSchema xmlns:ct="http://schemas.microsoft.com/office/2006/metadata/contentType" xmlns:ma="http://schemas.microsoft.com/office/2006/metadata/properties/metaAttributes" ct:_="" ma:_="" ma:contentTypeName="Document" ma:contentTypeID="0x01010080C9F2488912074FB587B9AD9ADAE5BB" ma:contentTypeVersion="11" ma:contentTypeDescription="Crée un document." ma:contentTypeScope="" ma:versionID="1bebaa2d391e7c30de2dcb588a772684">
   <xsd:schema xmlns:xsd="http://www.w3.org/2001/XMLSchema" xmlns:xs="http://www.w3.org/2001/XMLSchema" xmlns:p="http://schemas.microsoft.com/office/2006/metadata/properties" xmlns:ns2="b5cf4370-ac38-4b9e-9836-ef6f5df64f24" xmlns:ns3="eefa3612-053e-497a-ae76-8a76877f5e22" targetNamespace="http://schemas.microsoft.com/office/2006/metadata/properties" ma:root="true" ma:fieldsID="071e4af5f84e298b60331b8e79120627" ns2:_="" ns3:_="">
     <xsd:import namespace="b5cf4370-ac38-4b9e-9836-ef6f5df64f24"/>
@@ -5574,26 +5507,27 @@
 </ct:contentTypeSchema>
 </file>
 
-<file path=customXml/itemProps1.xml><?xml version="1.0" encoding="utf-8"?>
-<ds:datastoreItem xmlns:ds="http://schemas.openxmlformats.org/officeDocument/2006/customXml" ds:itemID="{8A70AF45-36D6-4247-AA7E-6372E9B9F7E1}">
-  <ds:schemaRefs>
-    <ds:schemaRef ds:uri="http://schemas.microsoft.com/office/2006/metadata/properties"/>
-    <ds:schemaRef ds:uri="http://schemas.microsoft.com/office/infopath/2007/PartnerControls"/>
-    <ds:schemaRef ds:uri="b5cf4370-ac38-4b9e-9836-ef6f5df64f24"/>
-    <ds:schemaRef ds:uri="eefa3612-053e-497a-ae76-8a76877f5e22"/>
-  </ds:schemaRefs>
-</ds:datastoreItem>
+<file path=customXml/item2.xml><?xml version="1.0" encoding="utf-8"?>
+<?mso-contentType ?>
+<FormTemplates xmlns="http://schemas.microsoft.com/sharepoint/v3/contenttype/forms">
+  <Display>DocumentLibraryForm</Display>
+  <Edit>DocumentLibraryForm</Edit>
+  <New>DocumentLibraryForm</New>
+</FormTemplates>
 </file>
 
-<file path=customXml/itemProps2.xml><?xml version="1.0" encoding="utf-8"?>
-<ds:datastoreItem xmlns:ds="http://schemas.openxmlformats.org/officeDocument/2006/customXml" ds:itemID="{64DB6A9B-4014-4350-8FE6-F72DA25DFBDF}">
-  <ds:schemaRefs>
-    <ds:schemaRef ds:uri="http://schemas.microsoft.com/sharepoint/v3/contenttype/forms"/>
-  </ds:schemaRefs>
-</ds:datastoreItem>
+<file path=customXml/item3.xml><?xml version="1.0" encoding="utf-8"?>
+<p:properties xmlns:p="http://schemas.microsoft.com/office/2006/metadata/properties" xmlns:xsi="http://www.w3.org/2001/XMLSchema-instance" xmlns:pc="http://schemas.microsoft.com/office/infopath/2007/PartnerControls">
+  <documentManagement>
+    <lcf76f155ced4ddcb4097134ff3c332f xmlns="b5cf4370-ac38-4b9e-9836-ef6f5df64f24">
+      <Terms xmlns="http://schemas.microsoft.com/office/infopath/2007/PartnerControls"/>
+    </lcf76f155ced4ddcb4097134ff3c332f>
+    <TaxCatchAll xmlns="eefa3612-053e-497a-ae76-8a76877f5e22" xsi:nil="true"/>
+  </documentManagement>
+</p:properties>
 </file>
 
-<file path=customXml/itemProps3.xml><?xml version="1.0" encoding="utf-8"?>
+<file path=customXml/itemProps1.xml><?xml version="1.0" encoding="utf-8"?>
 <ds:datastoreItem xmlns:ds="http://schemas.openxmlformats.org/officeDocument/2006/customXml" ds:itemID="{C2099935-ADE8-4E25-82AD-270299869B08}">
   <ds:schemaRefs>
     <ds:schemaRef ds:uri="http://schemas.microsoft.com/office/2006/metadata/contentType"/>
@@ -5610,4 +5544,23 @@
     <ds:schemaRef ds:uri="http://schemas.microsoft.com/internal/obd"/>
   </ds:schemaRefs>
 </ds:datastoreItem>
+</file>
+
+<file path=customXml/itemProps2.xml><?xml version="1.0" encoding="utf-8"?>
+<ds:datastoreItem xmlns:ds="http://schemas.openxmlformats.org/officeDocument/2006/customXml" ds:itemID="{64DB6A9B-4014-4350-8FE6-F72DA25DFBDF}">
+  <ds:schemaRefs>
+    <ds:schemaRef ds:uri="http://schemas.microsoft.com/sharepoint/v3/contenttype/forms"/>
+  </ds:schemaRefs>
+</ds:datastoreItem>
+</file>
+
+<file path=customXml/itemProps3.xml><?xml version="1.0" encoding="utf-8"?>
+<ds:datastoreItem xmlns:ds="http://schemas.openxmlformats.org/officeDocument/2006/customXml" ds:itemID="{8A70AF45-36D6-4247-AA7E-6372E9B9F7E1}">
+  <ds:schemaRefs>
+    <ds:schemaRef ds:uri="http://schemas.microsoft.com/office/2006/metadata/properties"/>
+    <ds:schemaRef ds:uri="http://schemas.microsoft.com/office/infopath/2007/PartnerControls"/>
+    <ds:schemaRef ds:uri="b5cf4370-ac38-4b9e-9836-ef6f5df64f24"/>
+    <ds:schemaRef ds:uri="eefa3612-053e-497a-ae76-8a76877f5e22"/>
+  </ds:schemaRefs>
+</ds:datastoreItem>
 </file>
</xml_diff>